<commit_message>
more session 2 slides for workshops
</commit_message>
<xml_diff>
--- a/UM_DataManagementClass/Lessons/11/11_SecondMeeting_CopyrightPrimerData_Shreeves.pptx
+++ b/UM_DataManagementClass/Lessons/11/11_SecondMeeting_CopyrightPrimerData_Shreeves.pptx
@@ -125,6 +125,22 @@
       </a:defRPr>
     </a:lvl9pPr>
   </p:defaultTextStyle>
+  <p:extLst>
+    <p:ext uri="{EFAFB233-063F-42B5-8137-9DF3F51BA10A}">
+      <p15:sldGuideLst xmlns:p15="http://schemas.microsoft.com/office/powerpoint/2012/main">
+        <p15:guide id="1" orient="horz" pos="2160">
+          <p15:clr>
+            <a:srgbClr val="A4A3A4"/>
+          </p15:clr>
+        </p15:guide>
+        <p15:guide id="2" pos="2880">
+          <p15:clr>
+            <a:srgbClr val="A4A3A4"/>
+          </p15:clr>
+        </p15:guide>
+      </p15:sldGuideLst>
+    </p:ext>
+  </p:extLst>
 </p:presentation>
 </file>
 
@@ -210,7 +226,7 @@
           <a:p>
             <a:fld id="{B9767889-7AC7-4D43-9945-0902090BBBE7}" type="datetimeFigureOut">
               <a:rPr lang="en-US" smtClean="0"/>
-              <a:t>3/30/16</a:t>
+              <a:t>12/2/2016</a:t>
             </a:fld>
             <a:endParaRPr lang="en-US"/>
           </a:p>
@@ -524,14 +540,14 @@
           <a:ln/>
           <a:extLst>
             <a:ext uri="{909E8E84-426E-40dd-AFC4-6F175D3DCCD1}">
-              <a14:hiddenFill xmlns:a14="http://schemas.microsoft.com/office/drawing/2010/main">
+              <a14:hiddenFill xmlns:a14="http://schemas.microsoft.com/office/drawing/2010/main" xmlns="">
                 <a:solidFill>
                   <a:srgbClr val="FFFFFF"/>
                 </a:solidFill>
               </a14:hiddenFill>
             </a:ext>
             <a:ext uri="{91240B29-F687-4f45-9708-019B960494DF}">
-              <a14:hiddenLine xmlns:a14="http://schemas.microsoft.com/office/drawing/2010/main" w="9525">
+              <a14:hiddenLine xmlns:a14="http://schemas.microsoft.com/office/drawing/2010/main" xmlns="" w="9525">
                 <a:solidFill>
                   <a:srgbClr val="000000"/>
                 </a:solidFill>
@@ -565,14 +581,14 @@
           <a:ln/>
           <a:extLst>
             <a:ext uri="{909E8E84-426E-40dd-AFC4-6F175D3DCCD1}">
-              <a14:hiddenFill xmlns:a14="http://schemas.microsoft.com/office/drawing/2010/main">
+              <a14:hiddenFill xmlns:a14="http://schemas.microsoft.com/office/drawing/2010/main" xmlns="">
                 <a:solidFill>
                   <a:srgbClr val="FFFFFF"/>
                 </a:solidFill>
               </a14:hiddenFill>
             </a:ext>
             <a:ext uri="{91240B29-F687-4f45-9708-019B960494DF}">
-              <a14:hiddenLine xmlns:a14="http://schemas.microsoft.com/office/drawing/2010/main" w="9525">
+              <a14:hiddenLine xmlns:a14="http://schemas.microsoft.com/office/drawing/2010/main" xmlns="" w="9525">
                 <a:solidFill>
                   <a:srgbClr val="000000"/>
                 </a:solidFill>
@@ -695,6 +711,11 @@
         </p:txBody>
       </p:sp>
     </p:spTree>
+    <p:extLst>
+      <p:ext uri="{BB962C8B-B14F-4D97-AF65-F5344CB8AC3E}">
+        <p14:creationId xmlns:p14="http://schemas.microsoft.com/office/powerpoint/2010/main" val="1348041454"/>
+      </p:ext>
+    </p:extLst>
   </p:cSld>
   <p:clrMapOvr>
     <a:masterClrMapping/>
@@ -734,14 +755,14 @@
           <a:ln/>
           <a:extLst>
             <a:ext uri="{909E8E84-426E-40dd-AFC4-6F175D3DCCD1}">
-              <a14:hiddenFill xmlns:a14="http://schemas.microsoft.com/office/drawing/2010/main">
+              <a14:hiddenFill xmlns:a14="http://schemas.microsoft.com/office/drawing/2010/main" xmlns="">
                 <a:solidFill>
                   <a:srgbClr val="FFFFFF"/>
                 </a:solidFill>
               </a14:hiddenFill>
             </a:ext>
             <a:ext uri="{91240B29-F687-4f45-9708-019B960494DF}">
-              <a14:hiddenLine xmlns:a14="http://schemas.microsoft.com/office/drawing/2010/main" w="9525">
+              <a14:hiddenLine xmlns:a14="http://schemas.microsoft.com/office/drawing/2010/main" xmlns="" w="9525">
                 <a:solidFill>
                   <a:srgbClr val="000000"/>
                 </a:solidFill>
@@ -896,14 +917,14 @@
           <a:ln/>
           <a:extLst>
             <a:ext uri="{909E8E84-426E-40dd-AFC4-6F175D3DCCD1}">
-              <a14:hiddenFill xmlns:a14="http://schemas.microsoft.com/office/drawing/2010/main">
+              <a14:hiddenFill xmlns:a14="http://schemas.microsoft.com/office/drawing/2010/main" xmlns="">
                 <a:solidFill>
                   <a:srgbClr val="FFFFFF"/>
                 </a:solidFill>
               </a14:hiddenFill>
             </a:ext>
             <a:ext uri="{91240B29-F687-4f45-9708-019B960494DF}">
-              <a14:hiddenLine xmlns:a14="http://schemas.microsoft.com/office/drawing/2010/main" w="9525">
+              <a14:hiddenLine xmlns:a14="http://schemas.microsoft.com/office/drawing/2010/main" xmlns="" w="9525">
                 <a:solidFill>
                   <a:srgbClr val="000000"/>
                 </a:solidFill>
@@ -929,6 +950,11 @@
         </p:txBody>
       </p:sp>
     </p:spTree>
+    <p:extLst>
+      <p:ext uri="{BB962C8B-B14F-4D97-AF65-F5344CB8AC3E}">
+        <p14:creationId xmlns:p14="http://schemas.microsoft.com/office/powerpoint/2010/main" val="194394587"/>
+      </p:ext>
+    </p:extLst>
   </p:cSld>
   <p:clrMapOvr>
     <a:masterClrMapping/>
@@ -982,14 +1008,14 @@
           <a:ln/>
           <a:extLst>
             <a:ext uri="{909E8E84-426E-40dd-AFC4-6F175D3DCCD1}">
-              <a14:hiddenFill xmlns:a14="http://schemas.microsoft.com/office/drawing/2010/main">
+              <a14:hiddenFill xmlns:a14="http://schemas.microsoft.com/office/drawing/2010/main" xmlns="">
                 <a:solidFill>
                   <a:srgbClr val="FFFFFF"/>
                 </a:solidFill>
               </a14:hiddenFill>
             </a:ext>
             <a:ext uri="{91240B29-F687-4f45-9708-019B960494DF}">
-              <a14:hiddenLine xmlns:a14="http://schemas.microsoft.com/office/drawing/2010/main" w="9525">
+              <a14:hiddenLine xmlns:a14="http://schemas.microsoft.com/office/drawing/2010/main" xmlns="" w="9525">
                 <a:solidFill>
                   <a:srgbClr val="000000"/>
                 </a:solidFill>
@@ -1304,14 +1330,14 @@
           <a:ln/>
           <a:extLst>
             <a:ext uri="{909E8E84-426E-40dd-AFC4-6F175D3DCCD1}">
-              <a14:hiddenFill xmlns:a14="http://schemas.microsoft.com/office/drawing/2010/main">
+              <a14:hiddenFill xmlns:a14="http://schemas.microsoft.com/office/drawing/2010/main" xmlns="">
                 <a:solidFill>
                   <a:srgbClr val="FFFFFF"/>
                 </a:solidFill>
               </a14:hiddenFill>
             </a:ext>
             <a:ext uri="{91240B29-F687-4f45-9708-019B960494DF}">
-              <a14:hiddenLine xmlns:a14="http://schemas.microsoft.com/office/drawing/2010/main" w="9525">
+              <a14:hiddenLine xmlns:a14="http://schemas.microsoft.com/office/drawing/2010/main" xmlns="" w="9525">
                 <a:solidFill>
                   <a:srgbClr val="000000"/>
                 </a:solidFill>
@@ -1434,6 +1460,11 @@
         </p:txBody>
       </p:sp>
     </p:spTree>
+    <p:extLst>
+      <p:ext uri="{BB962C8B-B14F-4D97-AF65-F5344CB8AC3E}">
+        <p14:creationId xmlns:p14="http://schemas.microsoft.com/office/powerpoint/2010/main" val="2008003185"/>
+      </p:ext>
+    </p:extLst>
   </p:cSld>
   <p:clrMapOvr>
     <a:masterClrMapping/>
@@ -1487,14 +1518,14 @@
           <a:ln/>
           <a:extLst>
             <a:ext uri="{909E8E84-426E-40dd-AFC4-6F175D3DCCD1}">
-              <a14:hiddenFill xmlns:a14="http://schemas.microsoft.com/office/drawing/2010/main">
+              <a14:hiddenFill xmlns:a14="http://schemas.microsoft.com/office/drawing/2010/main" xmlns="">
                 <a:solidFill>
                   <a:srgbClr val="FFFFFF"/>
                 </a:solidFill>
               </a14:hiddenFill>
             </a:ext>
             <a:ext uri="{91240B29-F687-4f45-9708-019B960494DF}">
-              <a14:hiddenLine xmlns:a14="http://schemas.microsoft.com/office/drawing/2010/main" w="9525">
+              <a14:hiddenLine xmlns:a14="http://schemas.microsoft.com/office/drawing/2010/main" xmlns="" w="9525">
                 <a:solidFill>
                   <a:srgbClr val="000000"/>
                 </a:solidFill>
@@ -1590,14 +1621,14 @@
           <a:ln/>
           <a:extLst>
             <a:ext uri="{909E8E84-426E-40dd-AFC4-6F175D3DCCD1}">
-              <a14:hiddenFill xmlns:a14="http://schemas.microsoft.com/office/drawing/2010/main">
+              <a14:hiddenFill xmlns:a14="http://schemas.microsoft.com/office/drawing/2010/main" xmlns="">
                 <a:solidFill>
                   <a:srgbClr val="FFFFFF"/>
                 </a:solidFill>
               </a14:hiddenFill>
             </a:ext>
             <a:ext uri="{91240B29-F687-4f45-9708-019B960494DF}">
-              <a14:hiddenLine xmlns:a14="http://schemas.microsoft.com/office/drawing/2010/main" w="9525">
+              <a14:hiddenLine xmlns:a14="http://schemas.microsoft.com/office/drawing/2010/main" xmlns="" w="9525">
                 <a:solidFill>
                   <a:srgbClr val="000000"/>
                 </a:solidFill>
@@ -1720,6 +1751,11 @@
         </p:txBody>
       </p:sp>
     </p:spTree>
+    <p:extLst>
+      <p:ext uri="{BB962C8B-B14F-4D97-AF65-F5344CB8AC3E}">
+        <p14:creationId xmlns:p14="http://schemas.microsoft.com/office/powerpoint/2010/main" val="3725010185"/>
+      </p:ext>
+    </p:extLst>
   </p:cSld>
   <p:clrMapOvr>
     <a:masterClrMapping/>
@@ -1773,14 +1809,14 @@
           <a:ln/>
           <a:extLst>
             <a:ext uri="{909E8E84-426E-40dd-AFC4-6F175D3DCCD1}">
-              <a14:hiddenFill xmlns:a14="http://schemas.microsoft.com/office/drawing/2010/main">
+              <a14:hiddenFill xmlns:a14="http://schemas.microsoft.com/office/drawing/2010/main" xmlns="">
                 <a:solidFill>
                   <a:srgbClr val="FFFFFF"/>
                 </a:solidFill>
               </a14:hiddenFill>
             </a:ext>
             <a:ext uri="{91240B29-F687-4f45-9708-019B960494DF}">
-              <a14:hiddenLine xmlns:a14="http://schemas.microsoft.com/office/drawing/2010/main" w="9525">
+              <a14:hiddenLine xmlns:a14="http://schemas.microsoft.com/office/drawing/2010/main" xmlns="" w="9525">
                 <a:solidFill>
                   <a:srgbClr val="000000"/>
                 </a:solidFill>
@@ -1814,14 +1850,14 @@
           <a:ln/>
           <a:extLst>
             <a:ext uri="{909E8E84-426E-40dd-AFC4-6F175D3DCCD1}">
-              <a14:hiddenFill xmlns:a14="http://schemas.microsoft.com/office/drawing/2010/main">
+              <a14:hiddenFill xmlns:a14="http://schemas.microsoft.com/office/drawing/2010/main" xmlns="">
                 <a:solidFill>
                   <a:srgbClr val="FFFFFF"/>
                 </a:solidFill>
               </a14:hiddenFill>
             </a:ext>
             <a:ext uri="{91240B29-F687-4f45-9708-019B960494DF}">
-              <a14:hiddenLine xmlns:a14="http://schemas.microsoft.com/office/drawing/2010/main" w="9525">
+              <a14:hiddenLine xmlns:a14="http://schemas.microsoft.com/office/drawing/2010/main" xmlns="" w="9525">
                 <a:solidFill>
                   <a:srgbClr val="000000"/>
                 </a:solidFill>
@@ -1944,6 +1980,11 @@
         </p:txBody>
       </p:sp>
     </p:spTree>
+    <p:extLst>
+      <p:ext uri="{BB962C8B-B14F-4D97-AF65-F5344CB8AC3E}">
+        <p14:creationId xmlns:p14="http://schemas.microsoft.com/office/powerpoint/2010/main" val="2028003908"/>
+      </p:ext>
+    </p:extLst>
   </p:cSld>
   <p:clrMapOvr>
     <a:masterClrMapping/>
@@ -1982,14 +2023,14 @@
           <a:noFill/>
           <a:extLst>
             <a:ext uri="{909E8E84-426E-40dd-AFC4-6F175D3DCCD1}">
-              <a14:hiddenFill xmlns:a14="http://schemas.microsoft.com/office/drawing/2010/main">
+              <a14:hiddenFill xmlns:a14="http://schemas.microsoft.com/office/drawing/2010/main" xmlns="">
                 <a:solidFill>
                   <a:srgbClr val="FFFFFF"/>
                 </a:solidFill>
               </a14:hiddenFill>
             </a:ext>
             <a:ext uri="{91240B29-F687-4f45-9708-019B960494DF}">
-              <a14:hiddenLine xmlns:a14="http://schemas.microsoft.com/office/drawing/2010/main" w="9525">
+              <a14:hiddenLine xmlns:a14="http://schemas.microsoft.com/office/drawing/2010/main" xmlns="" w="9525">
                 <a:solidFill>
                   <a:srgbClr val="000000"/>
                 </a:solidFill>
@@ -2142,7 +2183,7 @@
           </a:ln>
           <a:extLst>
             <a:ext uri="{909E8E84-426E-40dd-AFC4-6F175D3DCCD1}">
-              <a14:hiddenFill xmlns:a14="http://schemas.microsoft.com/office/drawing/2010/main">
+              <a14:hiddenFill xmlns:a14="http://schemas.microsoft.com/office/drawing/2010/main" xmlns="">
                 <a:solidFill>
                   <a:srgbClr val="FFFFFF"/>
                 </a:solidFill>
@@ -2165,14 +2206,14 @@
           <a:noFill/>
           <a:extLst>
             <a:ext uri="{909E8E84-426E-40dd-AFC4-6F175D3DCCD1}">
-              <a14:hiddenFill xmlns:a14="http://schemas.microsoft.com/office/drawing/2010/main">
+              <a14:hiddenFill xmlns:a14="http://schemas.microsoft.com/office/drawing/2010/main" xmlns="">
                 <a:solidFill>
                   <a:srgbClr val="FFFFFF"/>
                 </a:solidFill>
               </a14:hiddenFill>
             </a:ext>
             <a:ext uri="{91240B29-F687-4f45-9708-019B960494DF}">
-              <a14:hiddenLine xmlns:a14="http://schemas.microsoft.com/office/drawing/2010/main" w="9525">
+              <a14:hiddenLine xmlns:a14="http://schemas.microsoft.com/office/drawing/2010/main" xmlns="" w="9525">
                 <a:solidFill>
                   <a:srgbClr val="000000"/>
                 </a:solidFill>
@@ -2250,6 +2291,11 @@
         </p:txBody>
       </p:sp>
     </p:spTree>
+    <p:extLst>
+      <p:ext uri="{BB962C8B-B14F-4D97-AF65-F5344CB8AC3E}">
+        <p14:creationId xmlns:p14="http://schemas.microsoft.com/office/powerpoint/2010/main" val="1075610761"/>
+      </p:ext>
+    </p:extLst>
   </p:cSld>
   <p:clrMapOvr>
     <a:masterClrMapping/>
@@ -2296,7 +2342,7 @@
           </a:ln>
           <a:extLst>
             <a:ext uri="{909E8E84-426E-40dd-AFC4-6F175D3DCCD1}">
-              <a14:hiddenFill xmlns:a14="http://schemas.microsoft.com/office/drawing/2010/main">
+              <a14:hiddenFill xmlns:a14="http://schemas.microsoft.com/office/drawing/2010/main" xmlns="">
                 <a:solidFill>
                   <a:srgbClr val="FFFFFF"/>
                 </a:solidFill>
@@ -2319,14 +2365,14 @@
           <a:noFill/>
           <a:extLst>
             <a:ext uri="{909E8E84-426E-40dd-AFC4-6F175D3DCCD1}">
-              <a14:hiddenFill xmlns:a14="http://schemas.microsoft.com/office/drawing/2010/main">
+              <a14:hiddenFill xmlns:a14="http://schemas.microsoft.com/office/drawing/2010/main" xmlns="">
                 <a:solidFill>
                   <a:srgbClr val="FFFFFF"/>
                 </a:solidFill>
               </a14:hiddenFill>
             </a:ext>
             <a:ext uri="{91240B29-F687-4f45-9708-019B960494DF}">
-              <a14:hiddenLine xmlns:a14="http://schemas.microsoft.com/office/drawing/2010/main" w="9525">
+              <a14:hiddenLine xmlns:a14="http://schemas.microsoft.com/office/drawing/2010/main" xmlns="" w="9525">
                 <a:solidFill>
                   <a:srgbClr val="000000"/>
                 </a:solidFill>
@@ -2364,14 +2410,14 @@
           <a:noFill/>
           <a:extLst>
             <a:ext uri="{909E8E84-426E-40dd-AFC4-6F175D3DCCD1}">
-              <a14:hiddenFill xmlns:a14="http://schemas.microsoft.com/office/drawing/2010/main">
+              <a14:hiddenFill xmlns:a14="http://schemas.microsoft.com/office/drawing/2010/main" xmlns="">
                 <a:solidFill>
                   <a:srgbClr val="FFFFFF"/>
                 </a:solidFill>
               </a14:hiddenFill>
             </a:ext>
             <a:ext uri="{91240B29-F687-4f45-9708-019B960494DF}">
-              <a14:hiddenLine xmlns:a14="http://schemas.microsoft.com/office/drawing/2010/main" w="9525">
+              <a14:hiddenLine xmlns:a14="http://schemas.microsoft.com/office/drawing/2010/main" xmlns="" w="9525">
                 <a:solidFill>
                   <a:srgbClr val="000000"/>
                 </a:solidFill>
@@ -2507,6 +2553,11 @@
         </p:txBody>
       </p:sp>
     </p:spTree>
+    <p:extLst>
+      <p:ext uri="{BB962C8B-B14F-4D97-AF65-F5344CB8AC3E}">
+        <p14:creationId xmlns:p14="http://schemas.microsoft.com/office/powerpoint/2010/main" val="4026500227"/>
+      </p:ext>
+    </p:extLst>
   </p:cSld>
   <p:clrMapOvr>
     <a:masterClrMapping/>
@@ -2695,7 +2746,7 @@
           <a:p>
             <a:fld id="{44C947E9-CCFF-4773-A581-1431BD08F51E}" type="datetimeFigureOut">
               <a:rPr lang="en-US" smtClean="0"/>
-              <a:t>3/30/16</a:t>
+              <a:t>12/2/2016</a:t>
             </a:fld>
             <a:endParaRPr lang="en-US"/>
           </a:p>
@@ -2865,7 +2916,7 @@
           <a:p>
             <a:fld id="{44C947E9-CCFF-4773-A581-1431BD08F51E}" type="datetimeFigureOut">
               <a:rPr lang="en-US" smtClean="0"/>
-              <a:t>3/30/16</a:t>
+              <a:t>12/2/2016</a:t>
             </a:fld>
             <a:endParaRPr lang="en-US"/>
           </a:p>
@@ -3045,7 +3096,7 @@
           <a:p>
             <a:fld id="{44C947E9-CCFF-4773-A581-1431BD08F51E}" type="datetimeFigureOut">
               <a:rPr lang="en-US" smtClean="0"/>
-              <a:t>3/30/16</a:t>
+              <a:t>12/2/2016</a:t>
             </a:fld>
             <a:endParaRPr lang="en-US"/>
           </a:p>
@@ -3215,7 +3266,7 @@
           <a:p>
             <a:fld id="{44C947E9-CCFF-4773-A581-1431BD08F51E}" type="datetimeFigureOut">
               <a:rPr lang="en-US" smtClean="0"/>
-              <a:t>3/30/16</a:t>
+              <a:t>12/2/2016</a:t>
             </a:fld>
             <a:endParaRPr lang="en-US"/>
           </a:p>
@@ -3461,7 +3512,7 @@
           <a:p>
             <a:fld id="{44C947E9-CCFF-4773-A581-1431BD08F51E}" type="datetimeFigureOut">
               <a:rPr lang="en-US" smtClean="0"/>
-              <a:t>3/30/16</a:t>
+              <a:t>12/2/2016</a:t>
             </a:fld>
             <a:endParaRPr lang="en-US"/>
           </a:p>
@@ -3749,7 +3800,7 @@
           <a:p>
             <a:fld id="{44C947E9-CCFF-4773-A581-1431BD08F51E}" type="datetimeFigureOut">
               <a:rPr lang="en-US" smtClean="0"/>
-              <a:t>3/30/16</a:t>
+              <a:t>12/2/2016</a:t>
             </a:fld>
             <a:endParaRPr lang="en-US"/>
           </a:p>
@@ -4171,7 +4222,7 @@
           <a:p>
             <a:fld id="{44C947E9-CCFF-4773-A581-1431BD08F51E}" type="datetimeFigureOut">
               <a:rPr lang="en-US" smtClean="0"/>
-              <a:t>3/30/16</a:t>
+              <a:t>12/2/2016</a:t>
             </a:fld>
             <a:endParaRPr lang="en-US"/>
           </a:p>
@@ -4289,7 +4340,7 @@
           <a:p>
             <a:fld id="{44C947E9-CCFF-4773-A581-1431BD08F51E}" type="datetimeFigureOut">
               <a:rPr lang="en-US" smtClean="0"/>
-              <a:t>3/30/16</a:t>
+              <a:t>12/2/2016</a:t>
             </a:fld>
             <a:endParaRPr lang="en-US"/>
           </a:p>
@@ -4384,7 +4435,7 @@
           <a:p>
             <a:fld id="{44C947E9-CCFF-4773-A581-1431BD08F51E}" type="datetimeFigureOut">
               <a:rPr lang="en-US" smtClean="0"/>
-              <a:t>3/30/16</a:t>
+              <a:t>12/2/2016</a:t>
             </a:fld>
             <a:endParaRPr lang="en-US"/>
           </a:p>
@@ -4661,7 +4712,7 @@
           <a:p>
             <a:fld id="{44C947E9-CCFF-4773-A581-1431BD08F51E}" type="datetimeFigureOut">
               <a:rPr lang="en-US" smtClean="0"/>
-              <a:t>3/30/16</a:t>
+              <a:t>12/2/2016</a:t>
             </a:fld>
             <a:endParaRPr lang="en-US"/>
           </a:p>
@@ -4914,7 +4965,7 @@
           <a:p>
             <a:fld id="{44C947E9-CCFF-4773-A581-1431BD08F51E}" type="datetimeFigureOut">
               <a:rPr lang="en-US" smtClean="0"/>
-              <a:t>3/30/16</a:t>
+              <a:t>12/2/2016</a:t>
             </a:fld>
             <a:endParaRPr lang="en-US"/>
           </a:p>
@@ -5127,7 +5178,7 @@
           <a:p>
             <a:fld id="{44C947E9-CCFF-4773-A581-1431BD08F51E}" type="datetimeFigureOut">
               <a:rPr lang="en-US" smtClean="0"/>
-              <a:t>3/30/16</a:t>
+              <a:t>12/2/2016</a:t>
             </a:fld>
             <a:endParaRPr lang="en-US"/>
           </a:p>
@@ -5524,14 +5575,14 @@
           </a:ln>
           <a:extLst>
             <a:ext uri="{909E8E84-426E-40dd-AFC4-6F175D3DCCD1}">
-              <a14:hiddenFill xmlns:a14="http://schemas.microsoft.com/office/drawing/2010/main">
+              <a14:hiddenFill xmlns:a14="http://schemas.microsoft.com/office/drawing/2010/main" xmlns="">
                 <a:solidFill>
                   <a:srgbClr val="FFFFFF"/>
                 </a:solidFill>
               </a14:hiddenFill>
             </a:ext>
             <a:ext uri="{91240B29-F687-4f45-9708-019B960494DF}">
-              <a14:hiddenLine xmlns:a14="http://schemas.microsoft.com/office/drawing/2010/main" w="9525">
+              <a14:hiddenLine xmlns:a14="http://schemas.microsoft.com/office/drawing/2010/main" xmlns="" w="9525">
                 <a:solidFill>
                   <a:srgbClr val="000000"/>
                 </a:solidFill>
@@ -5648,28 +5699,15 @@
             <a:pPr algn="ctr" eaLnBrk="1" hangingPunct="1"/>
             <a:r>
               <a:rPr lang="en-US" sz="4000" b="1" dirty="0" smtClean="0"/>
-              <a:t>Practical </a:t>
-            </a:r>
-            <a:r>
-              <a:rPr lang="en-US" sz="4000" b="1" dirty="0" smtClean="0"/>
-              <a:t>IP </a:t>
-            </a:r>
-            <a:r>
-              <a:rPr lang="en-US" sz="4000" b="1" dirty="0" smtClean="0"/>
-              <a:t>Considerations </a:t>
+              <a:t>Practical IP Considerations </a:t>
             </a:r>
             <a:br>
               <a:rPr lang="en-US" sz="4000" b="1" dirty="0" smtClean="0"/>
             </a:br>
             <a:r>
               <a:rPr lang="en-US" sz="4000" b="1" dirty="0" smtClean="0"/>
-              <a:t>for </a:t>
-            </a:r>
-            <a:r>
-              <a:rPr lang="en-US" sz="4000" b="1" dirty="0" smtClean="0"/>
-              <a:t>Data</a:t>
-            </a:r>
-            <a:endParaRPr lang="en-US" sz="4000" b="1" dirty="0" smtClean="0"/>
+              <a:t>for Data</a:t>
+            </a:r>
           </a:p>
           <a:p>
             <a:pPr algn="ctr" eaLnBrk="1" hangingPunct="1"/>
@@ -5738,14 +5776,14 @@
           </a:ln>
           <a:extLst>
             <a:ext uri="{909E8E84-426E-40dd-AFC4-6F175D3DCCD1}">
-              <a14:hiddenFill xmlns:a14="http://schemas.microsoft.com/office/drawing/2010/main">
+              <a14:hiddenFill xmlns:a14="http://schemas.microsoft.com/office/drawing/2010/main" xmlns="">
                 <a:solidFill>
                   <a:srgbClr val="FFFFFF"/>
                 </a:solidFill>
               </a14:hiddenFill>
             </a:ext>
             <a:ext uri="{91240B29-F687-4f45-9708-019B960494DF}">
-              <a14:hiddenLine xmlns:a14="http://schemas.microsoft.com/office/drawing/2010/main" w="9525">
+              <a14:hiddenLine xmlns:a14="http://schemas.microsoft.com/office/drawing/2010/main" xmlns="" w="9525">
                 <a:solidFill>
                   <a:srgbClr val="000000"/>
                 </a:solidFill>
@@ -5770,7 +5808,7 @@
   <p:timing>
     <p:tnLst>
       <p:par>
-        <p:cTn xmlns:p14="http://schemas.microsoft.com/office/powerpoint/2010/main" id="1" dur="indefinite" restart="never" nodeType="tmRoot"/>
+        <p:cTn id="1" dur="indefinite" restart="never" nodeType="tmRoot"/>
       </p:par>
     </p:tnLst>
   </p:timing>
@@ -6059,7 +6097,7 @@
   <p:timing>
     <p:tnLst>
       <p:par>
-        <p:cTn xmlns:p14="http://schemas.microsoft.com/office/powerpoint/2010/main" id="1" dur="indefinite" restart="never" nodeType="tmRoot">
+        <p:cTn id="1" dur="indefinite" restart="never" nodeType="tmRoot">
           <p:childTnLst>
             <p:seq concurrent="1" nextAc="seek">
               <p:cTn id="2" dur="indefinite" nodeType="mainSeq">
@@ -6909,14 +6947,14 @@
           </a:ln>
           <a:extLst>
             <a:ext uri="{909E8E84-426E-40dd-AFC4-6F175D3DCCD1}">
-              <a14:hiddenFill xmlns:a14="http://schemas.microsoft.com/office/drawing/2010/main">
+              <a14:hiddenFill xmlns:a14="http://schemas.microsoft.com/office/drawing/2010/main" xmlns="">
                 <a:solidFill>
                   <a:srgbClr val="FFFFFF"/>
                 </a:solidFill>
               </a14:hiddenFill>
             </a:ext>
             <a:ext uri="{91240B29-F687-4f45-9708-019B960494DF}">
-              <a14:hiddenLine xmlns:a14="http://schemas.microsoft.com/office/drawing/2010/main" w="9525">
+              <a14:hiddenLine xmlns:a14="http://schemas.microsoft.com/office/drawing/2010/main" xmlns="" w="9525">
                 <a:solidFill>
                   <a:srgbClr val="000000"/>
                 </a:solidFill>
@@ -6960,7 +6998,7 @@
   <p:timing>
     <p:tnLst>
       <p:par>
-        <p:cTn xmlns:p14="http://schemas.microsoft.com/office/powerpoint/2010/main" id="1" dur="indefinite" restart="never" nodeType="tmRoot">
+        <p:cTn id="1" dur="indefinite" restart="never" nodeType="tmRoot">
           <p:childTnLst>
             <p:seq concurrent="1" nextAc="seek">
               <p:cTn id="2" dur="indefinite" nodeType="mainSeq">
@@ -7507,7 +7545,7 @@
   <p:timing>
     <p:tnLst>
       <p:par>
-        <p:cTn xmlns:p14="http://schemas.microsoft.com/office/powerpoint/2010/main" id="1" dur="indefinite" restart="never" nodeType="tmRoot"/>
+        <p:cTn id="1" dur="indefinite" restart="never" nodeType="tmRoot"/>
       </p:par>
     </p:tnLst>
   </p:timing>
@@ -7672,14 +7710,14 @@
           </a:ln>
           <a:extLst>
             <a:ext uri="{909E8E84-426E-40dd-AFC4-6F175D3DCCD1}">
-              <a14:hiddenFill xmlns:a14="http://schemas.microsoft.com/office/drawing/2010/main">
+              <a14:hiddenFill xmlns:a14="http://schemas.microsoft.com/office/drawing/2010/main" xmlns="">
                 <a:solidFill>
                   <a:srgbClr val="FFFFFF"/>
                 </a:solidFill>
               </a14:hiddenFill>
             </a:ext>
             <a:ext uri="{91240B29-F687-4f45-9708-019B960494DF}">
-              <a14:hiddenLine xmlns:a14="http://schemas.microsoft.com/office/drawing/2010/main" w="9525">
+              <a14:hiddenLine xmlns:a14="http://schemas.microsoft.com/office/drawing/2010/main" xmlns="" w="9525">
                 <a:solidFill>
                   <a:srgbClr val="000000"/>
                 </a:solidFill>
@@ -7704,7 +7742,7 @@
   <p:timing>
     <p:tnLst>
       <p:par>
-        <p:cTn xmlns:p14="http://schemas.microsoft.com/office/powerpoint/2010/main" id="1" dur="indefinite" restart="never" nodeType="tmRoot"/>
+        <p:cTn id="1" dur="indefinite" restart="never" nodeType="tmRoot"/>
       </p:par>
     </p:tnLst>
   </p:timing>
@@ -7851,7 +7889,7 @@
   <p:timing>
     <p:tnLst>
       <p:par>
-        <p:cTn xmlns:p14="http://schemas.microsoft.com/office/powerpoint/2010/main" id="1" dur="indefinite" restart="never" nodeType="tmRoot"/>
+        <p:cTn id="1" dur="indefinite" restart="never" nodeType="tmRoot"/>
       </p:par>
     </p:tnLst>
   </p:timing>
@@ -8038,7 +8076,7 @@
   <p:timing>
     <p:tnLst>
       <p:par>
-        <p:cTn xmlns:p14="http://schemas.microsoft.com/office/powerpoint/2010/main" id="1" dur="indefinite" restart="never" nodeType="tmRoot"/>
+        <p:cTn id="1" dur="indefinite" restart="never" nodeType="tmRoot"/>
       </p:par>
     </p:tnLst>
   </p:timing>
@@ -8525,14 +8563,14 @@
           </a:ln>
           <a:extLst>
             <a:ext uri="{909E8E84-426E-40dd-AFC4-6F175D3DCCD1}">
-              <a14:hiddenFill xmlns:a14="http://schemas.microsoft.com/office/drawing/2010/main">
+              <a14:hiddenFill xmlns:a14="http://schemas.microsoft.com/office/drawing/2010/main" xmlns="">
                 <a:solidFill>
                   <a:srgbClr val="FFFFFF"/>
                 </a:solidFill>
               </a14:hiddenFill>
             </a:ext>
             <a:ext uri="{91240B29-F687-4f45-9708-019B960494DF}">
-              <a14:hiddenLine xmlns:a14="http://schemas.microsoft.com/office/drawing/2010/main" w="9525">
+              <a14:hiddenLine xmlns:a14="http://schemas.microsoft.com/office/drawing/2010/main" xmlns="" w="9525">
                 <a:solidFill>
                   <a:srgbClr val="000000"/>
                 </a:solidFill>
@@ -8557,7 +8595,7 @@
   <p:timing>
     <p:tnLst>
       <p:par>
-        <p:cTn xmlns:p14="http://schemas.microsoft.com/office/powerpoint/2010/main" id="1" dur="indefinite" restart="never" nodeType="tmRoot"/>
+        <p:cTn id="1" dur="indefinite" restart="never" nodeType="tmRoot"/>
       </p:par>
     </p:tnLst>
   </p:timing>
@@ -8630,7 +8668,7 @@
   <p:timing>
     <p:tnLst>
       <p:par>
-        <p:cTn xmlns:p14="http://schemas.microsoft.com/office/powerpoint/2010/main" id="1" dur="indefinite" restart="never" nodeType="tmRoot"/>
+        <p:cTn id="1" dur="indefinite" restart="never" nodeType="tmRoot"/>
       </p:par>
     </p:tnLst>
   </p:timing>
@@ -8730,7 +8768,7 @@
   <p:timing>
     <p:tnLst>
       <p:par>
-        <p:cTn xmlns:p14="http://schemas.microsoft.com/office/powerpoint/2010/main" id="1" dur="indefinite" restart="never" nodeType="tmRoot"/>
+        <p:cTn id="1" dur="indefinite" restart="never" nodeType="tmRoot"/>
       </p:par>
     </p:tnLst>
   </p:timing>

</xml_diff>